<commit_message>
updated docs, some bugfixes
</commit_message>
<xml_diff>
--- a/source/docs/source/_images/processing/templates.pptx
+++ b/source/docs/source/_images/processing/templates.pptx
@@ -6,6 +6,8 @@
   </p:sldMasterIdLst>
   <p:sldIdLst>
     <p:sldId id="256" r:id="rId3"/>
+    <p:sldId id="257" r:id="rId4"/>
+    <p:sldId id="258" r:id="rId5"/>
   </p:sldIdLst>
   <p:sldSz cx="12192000" cy="6858000"/>
   <p:notesSz cx="12192000" cy="6858000"/>
@@ -3212,7 +3214,7 @@
           <a:graphicData uri="http://schemas.openxmlformats.org/drawingml/2006/table">
             <a:tbl>
               <a:tblPr firstRow="1" firstCol="0" lastRow="0" lastCol="0" bandRow="1" bandCol="0">
-                <a:tableStyleId>{7FBE15C3-6F92-9F52-5CE3-8C38352EB256}</a:tableStyleId>
+                <a:tableStyleId>{1C70BDA8-AF47-BCB5-A079-2C0A2771EC94}</a:tableStyleId>
               </a:tblPr>
               <a:tblGrid>
                 <a:gridCol w="540000"/>
@@ -3221,7 +3223,7 @@
                 <a:gridCol w="540000"/>
                 <a:gridCol w="540000"/>
               </a:tblGrid>
-              <a:tr h="644139">
+              <a:tr h="644138">
                 <a:tc>
                   <a:txBody>
                     <a:bodyPr/>
@@ -3283,7 +3285,7 @@
                   <a:tcPr/>
                 </a:tc>
               </a:tr>
-              <a:tr h="644139">
+              <a:tr h="644138">
                 <a:tc>
                   <a:txBody>
                     <a:bodyPr/>
@@ -3351,7 +3353,7 @@
                   <a:tcPr/>
                 </a:tc>
               </a:tr>
-              <a:tr h="644139">
+              <a:tr h="644138">
                 <a:tc>
                   <a:txBody>
                     <a:bodyPr/>
@@ -3413,7 +3415,7 @@
                   <a:tcPr/>
                 </a:tc>
               </a:tr>
-              <a:tr h="644139">
+              <a:tr h="644138">
                 <a:tc>
                   <a:txBody>
                     <a:bodyPr/>
@@ -3475,7 +3477,7 @@
                   <a:tcPr/>
                 </a:tc>
               </a:tr>
-              <a:tr h="644139">
+              <a:tr h="644138">
                 <a:tc>
                   <a:txBody>
                     <a:bodyPr/>
@@ -3790,7 +3792,7 @@
         </p:nvSpPr>
         <p:spPr bwMode="auto">
           <a:xfrm flipH="0" flipV="0">
-            <a:off x="1470665" y="5262165"/>
+            <a:off x="1470665" y="5262164"/>
             <a:ext cx="297251" cy="365795"/>
           </a:xfrm>
           <a:prstGeom prst="rect">
@@ -3809,6 +3811,487 @@
             <a:r>
               <a:rPr/>
               <a:t>y</a:t>
+            </a:r>
+            <a:endParaRPr/>
+          </a:p>
+        </p:txBody>
+      </p:sp>
+    </p:spTree>
+  </p:cSld>
+  <p:clrMapOvr>
+    <a:masterClrMapping/>
+  </p:clrMapOvr>
+  <mc:AlternateContent xmlns:mc="http://schemas.openxmlformats.org/markup-compatibility/2006">
+    <mc:Choice xmlns:p14="http://schemas.microsoft.com/office/powerpoint/2010/main" Requires="p14">
+      <p:transition p14:dur="2000" advClick="1"/>
+    </mc:Choice>
+    <mc:Fallback>
+      <p:transition advClick="1"/>
+    </mc:Fallback>
+  </mc:AlternateContent>
+</p:sld>
+</file>
+
+<file path=ppt/slides/slide2.xml><?xml version="1.0" encoding="utf-8"?>
+<p:sld xmlns:a="http://schemas.openxmlformats.org/drawingml/2006/main" xmlns:r="http://schemas.openxmlformats.org/officeDocument/2006/relationships" xmlns:p="http://schemas.openxmlformats.org/presentationml/2006/main" xmlns:m="http://schemas.openxmlformats.org/officeDocument/2006/math" xmlns:w="http://schemas.openxmlformats.org/wordprocessingml/2006/main" showMasterPhAnim="0" show="1">
+  <p:cSld name="">
+    <p:spTree>
+      <p:nvGrpSpPr>
+        <p:cNvPr id="1" name="" hidden="0"/>
+        <p:cNvGrpSpPr/>
+        <p:nvPr isPhoto="0" userDrawn="0"/>
+      </p:nvGrpSpPr>
+      <p:grpSpPr bwMode="auto">
+        <a:xfrm>
+          <a:off x="0" y="0"/>
+          <a:ext cx="0" cy="0"/>
+          <a:chOff x="0" y="0"/>
+          <a:chExt cx="0" cy="0"/>
+        </a:xfrm>
+      </p:grpSpPr>
+      <p:sp>
+        <p:nvSpPr>
+          <p:cNvPr id="1996037030" name="" hidden="0"/>
+          <p:cNvSpPr/>
+          <p:nvPr isPhoto="0" userDrawn="0"/>
+        </p:nvSpPr>
+        <p:spPr bwMode="auto">
+          <a:xfrm>
+            <a:off x="8646342" y="5071037"/>
+            <a:ext cx="254916" cy="365795"/>
+          </a:xfrm>
+        </p:spPr>
+        <p:txBody>
+          <a:bodyPr rot="0" spcFirstLastPara="0" vertOverflow="overflow" horzOverflow="clip" vert="horz" wrap="square" lIns="91440" tIns="45720" rIns="91440" bIns="45720" numCol="1" spcCol="0" rtlCol="0" fromWordArt="0" anchor="t" anchorCtr="0" forceAA="0" upright="0" compatLnSpc="1">
+            <a:prstTxWarp prst="textNoShape"/>
+            <a:spAutoFit/>
+          </a:bodyPr>
+          <a:p>
+            <a:pPr>
+              <a:defRPr/>
+            </a:pPr>
+            <a:endParaRPr/>
+          </a:p>
+        </p:txBody>
+      </p:sp>
+      <p:pic>
+        <p:nvPicPr>
+          <p:cNvPr id="1291339098" name="" hidden="0"/>
+          <p:cNvPicPr>
+            <a:picLocks noChangeAspect="1"/>
+          </p:cNvPicPr>
+          <p:nvPr isPhoto="0" userDrawn="0"/>
+        </p:nvPicPr>
+        <p:blipFill>
+          <a:blip r:embed="rId2"/>
+          <a:stretch/>
+        </p:blipFill>
+        <p:spPr bwMode="auto">
+          <a:xfrm>
+            <a:off x="2785613" y="1922971"/>
+            <a:ext cx="6429375" cy="2543175"/>
+          </a:xfrm>
+          <a:prstGeom prst="rect">
+            <a:avLst/>
+          </a:prstGeom>
+        </p:spPr>
+      </p:pic>
+      <p:cxnSp>
+        <p:nvCxnSpPr>
+          <p:cNvPr id="0" name="" hidden="0"/>
+          <p:cNvCxnSpPr>
+            <a:cxnSpLocks/>
+          </p:cNvCxnSpPr>
+          <p:nvPr isPhoto="0" userDrawn="0"/>
+        </p:nvCxnSpPr>
+        <p:spPr bwMode="auto">
+          <a:xfrm flipH="0" flipV="1">
+            <a:off x="3955613" y="3270848"/>
+            <a:ext cx="2084716" cy="0"/>
+          </a:xfrm>
+          <a:prstGeom prst="line">
+            <a:avLst/>
+          </a:prstGeom>
+          <a:ln w="38099" cap="flat" cmpd="sng" algn="ctr">
+            <a:solidFill>
+              <a:schemeClr val="accent2">
+                <a:lumMod val="60000"/>
+                <a:lumOff val="40000"/>
+              </a:schemeClr>
+            </a:solidFill>
+            <a:prstDash val="solid"/>
+            <a:miter/>
+          </a:ln>
+        </p:spPr>
+        <p:style>
+          <a:lnRef idx="1">
+            <a:schemeClr val="accent1">
+              <a:shade val="50000"/>
+            </a:schemeClr>
+          </a:lnRef>
+          <a:fillRef idx="0">
+            <a:schemeClr val="accent1"/>
+          </a:fillRef>
+          <a:effectRef idx="0">
+            <a:schemeClr val="accent1"/>
+          </a:effectRef>
+          <a:fontRef idx="minor">
+            <a:schemeClr val="tx1"/>
+          </a:fontRef>
+        </p:style>
+      </p:cxnSp>
+      <p:sp>
+        <p:nvSpPr>
+          <p:cNvPr id="1484949141" name="" hidden="0"/>
+          <p:cNvSpPr/>
+          <p:nvPr isPhoto="0" userDrawn="0"/>
+        </p:nvSpPr>
+        <p:spPr bwMode="auto">
+          <a:xfrm flipH="0" flipV="0">
+            <a:off x="4261131" y="2722712"/>
+            <a:ext cx="664952" cy="1096273"/>
+          </a:xfrm>
+          <a:prstGeom prst="arc">
+            <a:avLst>
+              <a:gd name="adj1" fmla="val 17241241"/>
+              <a:gd name="adj2" fmla="val 2"/>
+            </a:avLst>
+          </a:prstGeom>
+          <a:ln w="57150" cap="flat" cmpd="sng" algn="ctr">
+            <a:solidFill>
+              <a:schemeClr val="accent2">
+                <a:lumMod val="60000"/>
+                <a:lumOff val="40000"/>
+              </a:schemeClr>
+            </a:solidFill>
+            <a:prstDash val="solid"/>
+            <a:miter/>
+          </a:ln>
+        </p:spPr>
+        <p:style>
+          <a:lnRef idx="1">
+            <a:schemeClr val="accent1">
+              <a:shade val="50000"/>
+            </a:schemeClr>
+          </a:lnRef>
+          <a:fillRef idx="0">
+            <a:schemeClr val="accent1"/>
+          </a:fillRef>
+          <a:effectRef idx="0">
+            <a:schemeClr val="accent1"/>
+          </a:effectRef>
+          <a:fontRef idx="minor">
+            <a:schemeClr val="tx1"/>
+          </a:fontRef>
+        </p:style>
+      </p:sp>
+      <p:sp>
+        <p:nvSpPr>
+          <p:cNvPr id="23906216" name="" hidden="0"/>
+          <p:cNvSpPr/>
+          <p:nvPr isPhoto="0" userDrawn="0"/>
+        </p:nvSpPr>
+        <p:spPr bwMode="auto">
+          <a:xfrm flipH="0" flipV="0">
+            <a:off x="5051886" y="2372263"/>
+            <a:ext cx="2102688" cy="575094"/>
+          </a:xfrm>
+          <a:prstGeom prst="wedgeRectCallout">
+            <a:avLst>
+              <a:gd name="adj1" fmla="val -56837"/>
+              <a:gd name="adj2" fmla="val 31250"/>
+            </a:avLst>
+          </a:prstGeom>
+          <a:solidFill>
+            <a:schemeClr val="bg1"/>
+          </a:solidFill>
+          <a:ln w="38099" cap="flat" cmpd="sng" algn="ctr">
+            <a:solidFill>
+              <a:schemeClr val="accent2">
+                <a:lumMod val="60000"/>
+                <a:lumOff val="40000"/>
+              </a:schemeClr>
+            </a:solidFill>
+            <a:prstDash val="solid"/>
+            <a:miter/>
+          </a:ln>
+        </p:spPr>
+        <p:style>
+          <a:lnRef idx="2">
+            <a:schemeClr val="accent1">
+              <a:shade val="50000"/>
+            </a:schemeClr>
+          </a:lnRef>
+          <a:fillRef idx="1">
+            <a:schemeClr val="accent1"/>
+          </a:fillRef>
+          <a:effectRef idx="0">
+            <a:schemeClr val="accent1"/>
+          </a:effectRef>
+          <a:fontRef idx="minor">
+            <a:schemeClr val="lt1"/>
+          </a:fontRef>
+        </p:style>
+        <p:txBody>
+          <a:bodyPr vertOverflow="overflow" horzOverflow="clip" vert="horz" wrap="square" lIns="91440" tIns="45720" rIns="91440" bIns="45720" numCol="1" spcCol="0" rtlCol="0" fromWordArt="0" anchor="ctr" anchorCtr="0" forceAA="0" upright="0" compatLnSpc="0"/>
+          <a:p>
+            <a:pPr algn="ctr">
+              <a:defRPr/>
+            </a:pPr>
+            <a:r>
+              <a:rPr>
+                <a:solidFill>
+                  <a:schemeClr val="tx1"/>
+                </a:solidFill>
+              </a:rPr>
+              <a:t>start_angle: 30°</a:t>
+            </a:r>
+            <a:endParaRPr>
+              <a:solidFill>
+                <a:schemeClr val="tx1"/>
+              </a:solidFill>
+            </a:endParaRPr>
+          </a:p>
+        </p:txBody>
+      </p:sp>
+      <p:sp>
+        <p:nvSpPr>
+          <p:cNvPr id="1675030525" name="" hidden="0"/>
+          <p:cNvSpPr/>
+          <p:nvPr isPhoto="0" userDrawn="0"/>
+        </p:nvSpPr>
+        <p:spPr bwMode="auto">
+          <a:xfrm flipH="0" flipV="0">
+            <a:off x="3416461" y="2821556"/>
+            <a:ext cx="844669" cy="844669"/>
+          </a:xfrm>
+          <a:prstGeom prst="arc">
+            <a:avLst>
+              <a:gd name="adj1" fmla="val 6739715"/>
+              <a:gd name="adj2" fmla="val 2"/>
+            </a:avLst>
+          </a:prstGeom>
+          <a:ln w="57150" cap="flat" cmpd="sng" algn="ctr">
+            <a:solidFill>
+              <a:schemeClr val="accent3">
+                <a:lumMod val="60000"/>
+                <a:lumOff val="40000"/>
+              </a:schemeClr>
+            </a:solidFill>
+            <a:prstDash val="solid"/>
+            <a:miter/>
+          </a:ln>
+        </p:spPr>
+        <p:style>
+          <a:lnRef idx="1">
+            <a:schemeClr val="accent1">
+              <a:shade val="50000"/>
+            </a:schemeClr>
+          </a:lnRef>
+          <a:fillRef idx="0">
+            <a:schemeClr val="accent1"/>
+          </a:fillRef>
+          <a:effectRef idx="0">
+            <a:schemeClr val="accent1"/>
+          </a:effectRef>
+          <a:fontRef idx="minor">
+            <a:schemeClr val="tx1"/>
+          </a:fontRef>
+        </p:style>
+      </p:sp>
+      <p:sp>
+        <p:nvSpPr>
+          <p:cNvPr id="368426796" name="" hidden="0"/>
+          <p:cNvSpPr/>
+          <p:nvPr isPhoto="0" userDrawn="0"/>
+        </p:nvSpPr>
+        <p:spPr bwMode="auto">
+          <a:xfrm flipH="0" flipV="0">
+            <a:off x="3003112" y="2084716"/>
+            <a:ext cx="2102688" cy="575093"/>
+          </a:xfrm>
+          <a:prstGeom prst="wedgeRectCallout">
+            <a:avLst>
+              <a:gd name="adj1" fmla="val -19230"/>
+              <a:gd name="adj2" fmla="val 75000"/>
+            </a:avLst>
+          </a:prstGeom>
+          <a:solidFill>
+            <a:schemeClr val="bg1"/>
+          </a:solidFill>
+          <a:ln w="38099" cap="flat" cmpd="sng" algn="ctr">
+            <a:solidFill>
+              <a:schemeClr val="accent3">
+                <a:lumMod val="60000"/>
+                <a:lumOff val="40000"/>
+              </a:schemeClr>
+            </a:solidFill>
+            <a:prstDash val="solid"/>
+            <a:miter/>
+          </a:ln>
+        </p:spPr>
+        <p:style>
+          <a:lnRef idx="2">
+            <a:schemeClr val="accent1">
+              <a:shade val="50000"/>
+            </a:schemeClr>
+          </a:lnRef>
+          <a:fillRef idx="1">
+            <a:schemeClr val="accent1"/>
+          </a:fillRef>
+          <a:effectRef idx="0">
+            <a:schemeClr val="accent1"/>
+          </a:effectRef>
+          <a:fontRef idx="minor">
+            <a:schemeClr val="lt1"/>
+          </a:fontRef>
+        </p:style>
+        <p:txBody>
+          <a:bodyPr vertOverflow="overflow" horzOverflow="clip" vert="horz" wrap="square" lIns="91440" tIns="45720" rIns="91440" bIns="45720" numCol="1" spcCol="0" rtlCol="0" fromWordArt="0" anchor="ctr" anchorCtr="0" forceAA="0" upright="0" compatLnSpc="0"/>
+          <a:p>
+            <a:pPr algn="ctr">
+              <a:defRPr/>
+            </a:pPr>
+            <a:r>
+              <a:rPr>
+                <a:solidFill>
+                  <a:schemeClr val="tx1"/>
+                </a:solidFill>
+              </a:rPr>
+              <a:t>end_angle: 240°</a:t>
+            </a:r>
+            <a:endParaRPr>
+              <a:solidFill>
+                <a:schemeClr val="tx1"/>
+              </a:solidFill>
+            </a:endParaRPr>
+          </a:p>
+        </p:txBody>
+      </p:sp>
+    </p:spTree>
+  </p:cSld>
+  <p:clrMapOvr>
+    <a:masterClrMapping/>
+  </p:clrMapOvr>
+  <mc:AlternateContent xmlns:mc="http://schemas.openxmlformats.org/markup-compatibility/2006">
+    <mc:Choice xmlns:p14="http://schemas.microsoft.com/office/powerpoint/2010/main" Requires="p14">
+      <p:transition p14:dur="2000" advClick="1"/>
+    </mc:Choice>
+    <mc:Fallback>
+      <p:transition advClick="1"/>
+    </mc:Fallback>
+  </mc:AlternateContent>
+</p:sld>
+</file>
+
+<file path=ppt/slides/slide3.xml><?xml version="1.0" encoding="utf-8"?>
+<p:sld xmlns:a="http://schemas.openxmlformats.org/drawingml/2006/main" xmlns:r="http://schemas.openxmlformats.org/officeDocument/2006/relationships" xmlns:p="http://schemas.openxmlformats.org/presentationml/2006/main" xmlns:m="http://schemas.openxmlformats.org/officeDocument/2006/math" xmlns:w="http://schemas.openxmlformats.org/wordprocessingml/2006/main" showMasterPhAnim="0" show="1">
+  <p:cSld name="">
+    <p:spTree>
+      <p:nvGrpSpPr>
+        <p:cNvPr id="1" name="" hidden="0"/>
+        <p:cNvGrpSpPr/>
+        <p:nvPr isPhoto="0" userDrawn="0"/>
+      </p:nvGrpSpPr>
+      <p:grpSpPr bwMode="auto">
+        <a:xfrm>
+          <a:off x="0" y="0"/>
+          <a:ext cx="0" cy="0"/>
+          <a:chOff x="0" y="0"/>
+          <a:chExt cx="0" cy="0"/>
+        </a:xfrm>
+      </p:grpSpPr>
+      <p:sp>
+        <p:nvSpPr>
+          <p:cNvPr id="1224279492" name="" hidden="0"/>
+          <p:cNvSpPr/>
+          <p:nvPr isPhoto="0" userDrawn="0"/>
+        </p:nvSpPr>
+        <p:spPr bwMode="auto">
+          <a:xfrm flipH="0" flipV="0">
+            <a:off x="3128914" y="898584"/>
+            <a:ext cx="6505754" cy="4924245"/>
+          </a:xfrm>
+          <a:prstGeom prst="rect">
+            <a:avLst/>
+          </a:prstGeom>
+          <a:solidFill>
+            <a:schemeClr val="bg1"/>
+          </a:solidFill>
+          <a:ln w="12700" cap="flat" cmpd="sng" algn="ctr">
+            <a:solidFill>
+              <a:schemeClr val="tx1"/>
+            </a:solidFill>
+            <a:prstDash val="solid"/>
+            <a:miter/>
+          </a:ln>
+        </p:spPr>
+        <p:style>
+          <a:lnRef idx="2">
+            <a:schemeClr val="accent1">
+              <a:shade val="50000"/>
+            </a:schemeClr>
+          </a:lnRef>
+          <a:fillRef idx="1">
+            <a:schemeClr val="accent1"/>
+          </a:fillRef>
+          <a:effectRef idx="0">
+            <a:schemeClr val="accent1"/>
+          </a:effectRef>
+          <a:fontRef idx="minor">
+            <a:schemeClr val="lt1"/>
+          </a:fontRef>
+        </p:style>
+      </p:sp>
+      <p:pic>
+        <p:nvPicPr>
+          <p:cNvPr id="736122990" name="" hidden="0"/>
+          <p:cNvPicPr>
+            <a:picLocks noChangeAspect="1"/>
+          </p:cNvPicPr>
+          <p:nvPr isPhoto="0" userDrawn="0"/>
+        </p:nvPicPr>
+        <p:blipFill>
+          <a:blip r:embed="rId2"/>
+          <a:stretch/>
+        </p:blipFill>
+        <p:spPr bwMode="auto">
+          <a:xfrm flipH="0" flipV="0">
+            <a:off x="4189245" y="1371738"/>
+            <a:ext cx="3898378" cy="3977937"/>
+          </a:xfrm>
+          <a:prstGeom prst="rect">
+            <a:avLst/>
+          </a:prstGeom>
+        </p:spPr>
+      </p:pic>
+      <p:sp>
+        <p:nvSpPr>
+          <p:cNvPr id="1061392824" name="" hidden="0"/>
+          <p:cNvSpPr txBox="1"/>
+          <p:nvPr isPhoto="0" userDrawn="0"/>
+        </p:nvSpPr>
+        <p:spPr bwMode="auto">
+          <a:xfrm flipH="0" flipV="0">
+            <a:off x="3220990" y="1005942"/>
+            <a:ext cx="1936508" cy="365795"/>
+          </a:xfrm>
+          <a:prstGeom prst="rect">
+            <a:avLst/>
+          </a:prstGeom>
+          <a:noFill/>
+        </p:spPr>
+        <p:txBody>
+          <a:bodyPr vertOverflow="overflow" horzOverflow="clip" vert="horz" wrap="none" lIns="91440" tIns="45720" rIns="91440" bIns="45720" numCol="1" spcCol="0" rtlCol="0" fromWordArt="0" anchor="t" anchorCtr="0" forceAA="0" upright="0" compatLnSpc="0">
+            <a:spAutoFit/>
+          </a:bodyPr>
+          <a:p>
+            <a:pPr>
+              <a:defRPr/>
+            </a:pPr>
+            <a:r>
+              <a:rPr/>
+              <a:t>(red, green, blue)</a:t>
             </a:r>
             <a:endParaRPr/>
           </a:p>
@@ -3833,42 +4316,42 @@
 <file path=ppt/theme/theme1.xml><?xml version="1.0" encoding="utf-8"?>
 <a:theme xmlns:a="http://schemas.openxmlformats.org/drawingml/2006/main" xmlns:r="http://schemas.openxmlformats.org/officeDocument/2006/relationships" xmlns:p="http://schemas.openxmlformats.org/presentationml/2006/main" name="Office Theme">
   <a:themeElements>
-    <a:clrScheme name="New Office">
+    <a:clrScheme name="Metro">
       <a:dk1>
-        <a:sysClr val="windowText" lastClr="000000"/>
+        <a:srgbClr val="000000"/>
       </a:dk1>
       <a:lt1>
-        <a:sysClr val="window" lastClr="FFFFFF"/>
+        <a:srgbClr val="FFFFFF"/>
       </a:lt1>
       <a:dk2>
-        <a:srgbClr val="44546A"/>
+        <a:srgbClr val="4E5B6F"/>
       </a:dk2>
       <a:lt2>
-        <a:srgbClr val="E7E6E6"/>
+        <a:srgbClr val="D6ECFF"/>
       </a:lt2>
       <a:accent1>
-        <a:srgbClr val="5B9BD5"/>
+        <a:srgbClr val="7FD13B"/>
       </a:accent1>
       <a:accent2>
-        <a:srgbClr val="ED7D31"/>
+        <a:srgbClr val="EA157A"/>
       </a:accent2>
       <a:accent3>
-        <a:srgbClr val="A5A5A5"/>
+        <a:srgbClr val="FEB80A"/>
       </a:accent3>
       <a:accent4>
-        <a:srgbClr val="FFC000"/>
+        <a:srgbClr val="00ADDC"/>
       </a:accent4>
       <a:accent5>
-        <a:srgbClr val="4472C4"/>
+        <a:srgbClr val="738AC8"/>
       </a:accent5>
       <a:accent6>
-        <a:srgbClr val="70AD47"/>
+        <a:srgbClr val="1AB39F"/>
       </a:accent6>
       <a:hlink>
-        <a:srgbClr val="0563C1"/>
+        <a:srgbClr val="EB8803"/>
       </a:hlink>
       <a:folHlink>
-        <a:srgbClr val="954F72"/>
+        <a:srgbClr val="5F7791"/>
       </a:folHlink>
     </a:clrScheme>
     <a:fontScheme name="Office Theme">

</xml_diff>